<commit_message>
Fixed alignment in one of the header boxes
</commit_message>
<xml_diff>
--- a/TileFormats/Instanced3DModel/figures/header-layout.pptx
+++ b/TileFormats/Instanced3DModel/figures/header-layout.pptx
@@ -3222,10 +3222,6 @@
               </a:rPr>
               <a:t>magic</a:t>
             </a:r>
-            <a:endParaRPr lang="en-US" sz="1000" dirty="0" smtClean="0">
-              <a:latin typeface="Courier New"/>
-              <a:cs typeface="Courier New"/>
-            </a:endParaRPr>
           </a:p>
           <a:p>
             <a:pPr algn="ctr"/>
@@ -3295,10 +3291,6 @@
               </a:rPr>
               <a:t>version</a:t>
             </a:r>
-            <a:endParaRPr lang="en-US" sz="1000" dirty="0" smtClean="0">
-              <a:latin typeface="Courier New"/>
-              <a:cs typeface="Courier New"/>
-            </a:endParaRPr>
           </a:p>
           <a:p>
             <a:pPr algn="ctr"/>
@@ -3543,14 +3535,7 @@
                 <a:latin typeface="Courier New"/>
                 <a:cs typeface="Courier New"/>
               </a:rPr>
-              <a:t>36</a:t>
-            </a:r>
-            <a:r>
-              <a:rPr lang="en-US" sz="1000" dirty="0" smtClean="0">
-                <a:latin typeface="Courier New"/>
-                <a:cs typeface="Courier New"/>
-              </a:rPr>
-              <a:t>-byte header (first 20 bytes)</a:t>
+              <a:t>36-byte header (first 20 bytes)</a:t>
             </a:r>
             <a:endParaRPr lang="en-US" sz="1000" dirty="0">
               <a:latin typeface="Courier New"/>
@@ -3881,7 +3866,7 @@
         </p:nvSpPr>
         <p:spPr>
           <a:xfrm>
-            <a:off x="5632299" y="1862283"/>
+            <a:off x="5632299" y="1858875"/>
             <a:ext cx="954107" cy="400110"/>
           </a:xfrm>
           <a:prstGeom prst="rect">
@@ -4189,14 +4174,7 @@
                 <a:latin typeface="Courier New"/>
                 <a:cs typeface="Courier New"/>
               </a:rPr>
-              <a:t>36</a:t>
-            </a:r>
-            <a:r>
-              <a:rPr lang="en-US" sz="1000" dirty="0" smtClean="0">
-                <a:latin typeface="Courier New"/>
-                <a:cs typeface="Courier New"/>
-              </a:rPr>
-              <a:t>-byte header (next 16 bytes)</a:t>
+              <a:t>36-byte header (next 16 bytes)</a:t>
             </a:r>
             <a:endParaRPr lang="en-US" sz="1000" dirty="0">
               <a:latin typeface="Courier New"/>
@@ -4365,7 +4343,7 @@
         </p:nvSpPr>
         <p:spPr>
           <a:xfrm>
-            <a:off x="6559741" y="1911349"/>
+            <a:off x="6559741" y="1907941"/>
             <a:ext cx="269625" cy="430887"/>
           </a:xfrm>
           <a:prstGeom prst="rect">

</xml_diff>